<commit_message>
fix: wrong baseline for PR curve
</commit_message>
<xml_diff>
--- a/bio_slides.pptx
+++ b/bio_slides.pptx
@@ -3492,10 +3492,10 @@
       </p:sp>
       <p:pic>
         <p:nvPicPr>
-          <p:cNvPr id="7170" name="Picture 2">
-            <a:extLst>
-              <a:ext uri="{FF2B5EF4-FFF2-40B4-BE49-F238E27FC236}">
-                <a16:creationId xmlns:a16="http://schemas.microsoft.com/office/drawing/2014/main" id="{CEEE5FA3-5BAF-BA2E-9D5B-1491E52788B8}"/>
+          <p:cNvPr id="1026" name="Picture 2">
+            <a:extLst>
+              <a:ext uri="{FF2B5EF4-FFF2-40B4-BE49-F238E27FC236}">
+                <a16:creationId xmlns:a16="http://schemas.microsoft.com/office/drawing/2014/main" id="{A9986066-37F9-5D84-D320-99C159EFC30F}"/>
               </a:ext>
             </a:extLst>
           </p:cNvPr>
@@ -3519,7 +3519,7 @@
         </p:blipFill>
         <p:spPr bwMode="auto">
           <a:xfrm>
-            <a:off x="4560371" y="993775"/>
+            <a:off x="4765261" y="1196285"/>
             <a:ext cx="7213600" cy="5499100"/>
           </a:xfrm>
           <a:prstGeom prst="rect">
@@ -3732,7 +3732,9 @@
         </p:nvSpPr>
         <p:spPr/>
         <p:txBody>
-          <a:bodyPr/>
+          <a:bodyPr>
+            <a:normAutofit lnSpcReduction="10000"/>
+          </a:bodyPr>
           <a:lstStyle/>
           <a:p>
             <a:r>
@@ -3751,6 +3753,13 @@
             <a:pPr lvl="1"/>
             <a:r>
               <a:rPr lang="en-NO" dirty="0"/>
+              <a:t>XGBoost is the only one that stays above the baseline (“coin-toss”)</a:t>
+            </a:r>
+          </a:p>
+          <a:p>
+            <a:pPr lvl="1"/>
+            <a:r>
+              <a:rPr lang="en-NO" dirty="0"/>
               <a:t>SVC isn’t doing very well</a:t>
             </a:r>
           </a:p>
@@ -3777,14 +3786,18 @@
           <a:p>
             <a:r>
               <a:rPr lang="en-NO" dirty="0"/>
-              <a:t>Overall, I’d go with LogReg/XGBoost</a:t>
+              <a:t>Overall, I’d go with XGBoost</a:t>
             </a:r>
           </a:p>
           <a:p>
             <a:pPr lvl="1"/>
             <a:r>
+              <a:rPr lang="en-GB" dirty="0"/>
+              <a:t>I</a:t>
+            </a:r>
+            <a:r>
               <a:rPr lang="en-NO" dirty="0"/>
-              <a:t>Both are “explainable”, so yay</a:t>
+              <a:t>t’s also “explainable”, so yay</a:t>
             </a:r>
           </a:p>
         </p:txBody>

</xml_diff>

<commit_message>
feat: focus on minority class
</commit_message>
<xml_diff>
--- a/bio_slides.pptx
+++ b/bio_slides.pptx
@@ -15,10 +15,12 @@
     <p:sldId id="259" r:id="rId9"/>
     <p:sldId id="270" r:id="rId10"/>
     <p:sldId id="267" r:id="rId11"/>
-    <p:sldId id="263" r:id="rId12"/>
-    <p:sldId id="268" r:id="rId13"/>
-    <p:sldId id="269" r:id="rId14"/>
-    <p:sldId id="260" r:id="rId15"/>
+    <p:sldId id="275" r:id="rId12"/>
+    <p:sldId id="263" r:id="rId13"/>
+    <p:sldId id="276" r:id="rId14"/>
+    <p:sldId id="268" r:id="rId15"/>
+    <p:sldId id="269" r:id="rId16"/>
+    <p:sldId id="260" r:id="rId17"/>
   </p:sldIdLst>
   <p:sldSz cx="12192000" cy="6858000"/>
   <p:notesSz cx="6858000" cy="9144000"/>
@@ -274,7 +276,7 @@
           <a:p>
             <a:fld id="{F3113929-CE24-9C4B-8035-8B9D5F90FA51}" type="datetimeFigureOut">
               <a:rPr lang="en-NO" smtClean="0"/>
-              <a:t>31/01/2023</a:t>
+              <a:t>03/02/2023</a:t>
             </a:fld>
             <a:endParaRPr lang="en-NO"/>
           </a:p>
@@ -474,7 +476,7 @@
           <a:p>
             <a:fld id="{F3113929-CE24-9C4B-8035-8B9D5F90FA51}" type="datetimeFigureOut">
               <a:rPr lang="en-NO" smtClean="0"/>
-              <a:t>31/01/2023</a:t>
+              <a:t>03/02/2023</a:t>
             </a:fld>
             <a:endParaRPr lang="en-NO"/>
           </a:p>
@@ -684,7 +686,7 @@
           <a:p>
             <a:fld id="{F3113929-CE24-9C4B-8035-8B9D5F90FA51}" type="datetimeFigureOut">
               <a:rPr lang="en-NO" smtClean="0"/>
-              <a:t>31/01/2023</a:t>
+              <a:t>03/02/2023</a:t>
             </a:fld>
             <a:endParaRPr lang="en-NO"/>
           </a:p>
@@ -884,7 +886,7 @@
           <a:p>
             <a:fld id="{F3113929-CE24-9C4B-8035-8B9D5F90FA51}" type="datetimeFigureOut">
               <a:rPr lang="en-NO" smtClean="0"/>
-              <a:t>31/01/2023</a:t>
+              <a:t>03/02/2023</a:t>
             </a:fld>
             <a:endParaRPr lang="en-NO"/>
           </a:p>
@@ -1160,7 +1162,7 @@
           <a:p>
             <a:fld id="{F3113929-CE24-9C4B-8035-8B9D5F90FA51}" type="datetimeFigureOut">
               <a:rPr lang="en-NO" smtClean="0"/>
-              <a:t>31/01/2023</a:t>
+              <a:t>03/02/2023</a:t>
             </a:fld>
             <a:endParaRPr lang="en-NO"/>
           </a:p>
@@ -1428,7 +1430,7 @@
           <a:p>
             <a:fld id="{F3113929-CE24-9C4B-8035-8B9D5F90FA51}" type="datetimeFigureOut">
               <a:rPr lang="en-NO" smtClean="0"/>
-              <a:t>31/01/2023</a:t>
+              <a:t>03/02/2023</a:t>
             </a:fld>
             <a:endParaRPr lang="en-NO"/>
           </a:p>
@@ -1843,7 +1845,7 @@
           <a:p>
             <a:fld id="{F3113929-CE24-9C4B-8035-8B9D5F90FA51}" type="datetimeFigureOut">
               <a:rPr lang="en-NO" smtClean="0"/>
-              <a:t>31/01/2023</a:t>
+              <a:t>03/02/2023</a:t>
             </a:fld>
             <a:endParaRPr lang="en-NO"/>
           </a:p>
@@ -1985,7 +1987,7 @@
           <a:p>
             <a:fld id="{F3113929-CE24-9C4B-8035-8B9D5F90FA51}" type="datetimeFigureOut">
               <a:rPr lang="en-NO" smtClean="0"/>
-              <a:t>31/01/2023</a:t>
+              <a:t>03/02/2023</a:t>
             </a:fld>
             <a:endParaRPr lang="en-NO"/>
           </a:p>
@@ -2098,7 +2100,7 @@
           <a:p>
             <a:fld id="{F3113929-CE24-9C4B-8035-8B9D5F90FA51}" type="datetimeFigureOut">
               <a:rPr lang="en-NO" smtClean="0"/>
-              <a:t>31/01/2023</a:t>
+              <a:t>03/02/2023</a:t>
             </a:fld>
             <a:endParaRPr lang="en-NO"/>
           </a:p>
@@ -2411,7 +2413,7 @@
           <a:p>
             <a:fld id="{F3113929-CE24-9C4B-8035-8B9D5F90FA51}" type="datetimeFigureOut">
               <a:rPr lang="en-NO" smtClean="0"/>
-              <a:t>31/01/2023</a:t>
+              <a:t>03/02/2023</a:t>
             </a:fld>
             <a:endParaRPr lang="en-NO"/>
           </a:p>
@@ -2700,7 +2702,7 @@
           <a:p>
             <a:fld id="{F3113929-CE24-9C4B-8035-8B9D5F90FA51}" type="datetimeFigureOut">
               <a:rPr lang="en-NO" smtClean="0"/>
-              <a:t>31/01/2023</a:t>
+              <a:t>03/02/2023</a:t>
             </a:fld>
             <a:endParaRPr lang="en-NO"/>
           </a:p>
@@ -2943,7 +2945,7 @@
           <a:p>
             <a:fld id="{F3113929-CE24-9C4B-8035-8B9D5F90FA51}" type="datetimeFigureOut">
               <a:rPr lang="en-NO" smtClean="0"/>
-              <a:t>31/01/2023</a:t>
+              <a:t>03/02/2023</a:t>
             </a:fld>
             <a:endParaRPr lang="en-NO"/>
           </a:p>
@@ -3446,7 +3448,7 @@
 </file>
 
 <file path=ppt/slides/slide10.xml><?xml version="1.0" encoding="utf-8"?>
-<p:sld xmlns:a="http://schemas.openxmlformats.org/drawingml/2006/main" xmlns:r="http://schemas.openxmlformats.org/officeDocument/2006/relationships" xmlns:p="http://schemas.openxmlformats.org/presentationml/2006/main">
+<p:sld xmlns:a="http://schemas.openxmlformats.org/drawingml/2006/main" xmlns:r="http://schemas.openxmlformats.org/officeDocument/2006/relationships" xmlns:p="http://schemas.openxmlformats.org/presentationml/2006/main" show="0">
   <p:cSld>
     <p:spTree>
       <p:nvGrpSpPr>
@@ -3544,6 +3546,41 @@
           </a:extLst>
         </p:spPr>
       </p:pic>
+      <p:sp>
+        <p:nvSpPr>
+          <p:cNvPr id="11" name="Content Placeholder 7">
+            <a:extLst>
+              <a:ext uri="{FF2B5EF4-FFF2-40B4-BE49-F238E27FC236}">
+                <a16:creationId xmlns:a16="http://schemas.microsoft.com/office/drawing/2014/main" id="{192243E5-A38B-F53A-5072-597D0396B4F1}"/>
+              </a:ext>
+            </a:extLst>
+          </p:cNvPr>
+          <p:cNvSpPr>
+            <a:spLocks noGrp="1"/>
+          </p:cNvSpPr>
+          <p:nvPr>
+            <p:ph idx="1"/>
+          </p:nvPr>
+        </p:nvSpPr>
+        <p:spPr>
+          <a:xfrm>
+            <a:off x="838200" y="1825625"/>
+            <a:ext cx="3927061" cy="4351338"/>
+          </a:xfrm>
+        </p:spPr>
+        <p:txBody>
+          <a:bodyPr>
+            <a:normAutofit/>
+          </a:bodyPr>
+          <a:lstStyle/>
+          <a:p>
+            <a:r>
+              <a:rPr lang="en-NO" sz="2400" dirty="0"/>
+              <a:t>Predict Y=True (75%)</a:t>
+            </a:r>
+          </a:p>
+        </p:txBody>
+      </p:sp>
     </p:spTree>
     <p:extLst>
       <p:ext uri="{BB962C8B-B14F-4D97-AF65-F5344CB8AC3E}">
@@ -3574,6 +3611,60 @@
           <a:chExt cx="0" cy="0"/>
         </a:xfrm>
       </p:grpSpPr>
+      <p:pic>
+        <p:nvPicPr>
+          <p:cNvPr id="3" name="Picture 2">
+            <a:extLst>
+              <a:ext uri="{FF2B5EF4-FFF2-40B4-BE49-F238E27FC236}">
+                <a16:creationId xmlns:a16="http://schemas.microsoft.com/office/drawing/2014/main" id="{75E42ABB-D9B2-DBEF-36A8-F55ABEEC7E5F}"/>
+              </a:ext>
+            </a:extLst>
+          </p:cNvPr>
+          <p:cNvPicPr>
+            <a:picLocks noChangeAspect="1" noChangeArrowheads="1"/>
+          </p:cNvPicPr>
+          <p:nvPr/>
+        </p:nvPicPr>
+        <p:blipFill>
+          <a:blip r:embed="rId2">
+            <a:extLst>
+              <a:ext uri="{28A0092B-C50C-407E-A947-70E740481C1C}">
+                <a14:useLocalDpi xmlns:a14="http://schemas.microsoft.com/office/drawing/2010/main" val="0"/>
+              </a:ext>
+            </a:extLst>
+          </a:blip>
+          <a:srcRect/>
+          <a:stretch>
+            <a:fillRect/>
+          </a:stretch>
+        </p:blipFill>
+        <p:spPr bwMode="auto">
+          <a:xfrm>
+            <a:off x="4765261" y="1196285"/>
+            <a:ext cx="7213600" cy="5499100"/>
+          </a:xfrm>
+          <a:prstGeom prst="rect">
+            <a:avLst/>
+          </a:prstGeom>
+          <a:noFill/>
+          <a:effectLst>
+            <a:outerShdw blurRad="50800" dist="38100" dir="2700000" algn="tl" rotWithShape="0">
+              <a:prstClr val="black">
+                <a:alpha val="40000"/>
+              </a:prstClr>
+            </a:outerShdw>
+          </a:effectLst>
+          <a:extLst>
+            <a:ext uri="{909E8E84-426E-40DD-AFC4-6F175D3DCCD1}">
+              <a14:hiddenFill xmlns:a14="http://schemas.microsoft.com/office/drawing/2010/main">
+                <a:solidFill>
+                  <a:srgbClr val="FFFFFF"/>
+                </a:solidFill>
+              </a14:hiddenFill>
+            </a:ext>
+          </a:extLst>
+        </p:spPr>
+      </p:pic>
       <p:sp>
         <p:nvSpPr>
           <p:cNvPr id="2" name="Title 1">
@@ -3598,6 +3689,141 @@
             <a:r>
               <a:rPr lang="en-NO" dirty="0"/>
               <a:t>Classification</a:t>
+            </a:r>
+          </a:p>
+        </p:txBody>
+      </p:sp>
+      <p:sp>
+        <p:nvSpPr>
+          <p:cNvPr id="8" name="Content Placeholder 7">
+            <a:extLst>
+              <a:ext uri="{FF2B5EF4-FFF2-40B4-BE49-F238E27FC236}">
+                <a16:creationId xmlns:a16="http://schemas.microsoft.com/office/drawing/2014/main" id="{9E2F77C0-C168-6690-DBD1-4A470E952FBB}"/>
+              </a:ext>
+            </a:extLst>
+          </p:cNvPr>
+          <p:cNvSpPr>
+            <a:spLocks noGrp="1"/>
+          </p:cNvSpPr>
+          <p:nvPr>
+            <p:ph idx="1"/>
+          </p:nvPr>
+        </p:nvSpPr>
+        <p:spPr>
+          <a:xfrm>
+            <a:off x="838200" y="1825625"/>
+            <a:ext cx="3927061" cy="4351338"/>
+          </a:xfrm>
+        </p:spPr>
+        <p:txBody>
+          <a:bodyPr>
+            <a:normAutofit/>
+          </a:bodyPr>
+          <a:lstStyle/>
+          <a:p>
+            <a:r>
+              <a:rPr lang="en-NO" sz="2400" dirty="0"/>
+              <a:t>Predict Y=False (25%)</a:t>
+            </a:r>
+          </a:p>
+          <a:p>
+            <a:r>
+              <a:rPr lang="en-NO" sz="2400" dirty="0"/>
+              <a:t>Minority Most Interesting</a:t>
+            </a:r>
+          </a:p>
+          <a:p>
+            <a:endParaRPr lang="en-NO" sz="2400" dirty="0"/>
+          </a:p>
+        </p:txBody>
+      </p:sp>
+    </p:spTree>
+    <p:extLst>
+      <p:ext uri="{BB962C8B-B14F-4D97-AF65-F5344CB8AC3E}">
+        <p14:creationId xmlns:p14="http://schemas.microsoft.com/office/powerpoint/2010/main" val="2832775937"/>
+      </p:ext>
+    </p:extLst>
+  </p:cSld>
+  <p:clrMapOvr>
+    <a:masterClrMapping/>
+  </p:clrMapOvr>
+</p:sld>
+</file>
+
+<file path=ppt/slides/slide12.xml><?xml version="1.0" encoding="utf-8"?>
+<p:sld xmlns:a="http://schemas.openxmlformats.org/drawingml/2006/main" xmlns:r="http://schemas.openxmlformats.org/officeDocument/2006/relationships" xmlns:p="http://schemas.openxmlformats.org/presentationml/2006/main" show="0">
+  <p:cSld>
+    <p:spTree>
+      <p:nvGrpSpPr>
+        <p:cNvPr id="1" name=""/>
+        <p:cNvGrpSpPr/>
+        <p:nvPr/>
+      </p:nvGrpSpPr>
+      <p:grpSpPr>
+        <a:xfrm>
+          <a:off x="0" y="0"/>
+          <a:ext cx="0" cy="0"/>
+          <a:chOff x="0" y="0"/>
+          <a:chExt cx="0" cy="0"/>
+        </a:xfrm>
+      </p:grpSpPr>
+      <p:sp>
+        <p:nvSpPr>
+          <p:cNvPr id="2" name="Title 1">
+            <a:extLst>
+              <a:ext uri="{FF2B5EF4-FFF2-40B4-BE49-F238E27FC236}">
+                <a16:creationId xmlns:a16="http://schemas.microsoft.com/office/drawing/2014/main" id="{9FC47821-D938-7A0D-D148-09674C3976B1}"/>
+              </a:ext>
+            </a:extLst>
+          </p:cNvPr>
+          <p:cNvSpPr>
+            <a:spLocks noGrp="1"/>
+          </p:cNvSpPr>
+          <p:nvPr>
+            <p:ph type="title"/>
+          </p:nvPr>
+        </p:nvSpPr>
+        <p:spPr/>
+        <p:txBody>
+          <a:bodyPr/>
+          <a:lstStyle/>
+          <a:p>
+            <a:r>
+              <a:rPr lang="en-NO" dirty="0"/>
+              <a:t>Classification</a:t>
+            </a:r>
+          </a:p>
+        </p:txBody>
+      </p:sp>
+      <p:sp>
+        <p:nvSpPr>
+          <p:cNvPr id="3" name="Content Placeholder 2">
+            <a:extLst>
+              <a:ext uri="{FF2B5EF4-FFF2-40B4-BE49-F238E27FC236}">
+                <a16:creationId xmlns:a16="http://schemas.microsoft.com/office/drawing/2014/main" id="{25110F7E-36E6-32AF-6D06-2F705B202EF2}"/>
+              </a:ext>
+            </a:extLst>
+          </p:cNvPr>
+          <p:cNvSpPr>
+            <a:spLocks noGrp="1"/>
+          </p:cNvSpPr>
+          <p:nvPr>
+            <p:ph idx="1"/>
+          </p:nvPr>
+        </p:nvSpPr>
+        <p:spPr>
+          <a:xfrm>
+            <a:off x="838200" y="1825625"/>
+            <a:ext cx="3260464" cy="4351338"/>
+          </a:xfrm>
+        </p:spPr>
+        <p:txBody>
+          <a:bodyPr/>
+          <a:lstStyle/>
+          <a:p>
+            <a:r>
+              <a:rPr lang="en-NO" dirty="0"/>
+              <a:t>Predict Y=True</a:t>
             </a:r>
           </a:p>
         </p:txBody>
@@ -3669,152 +3895,6 @@
 </p:sld>
 </file>
 
-<file path=ppt/slides/slide12.xml><?xml version="1.0" encoding="utf-8"?>
-<p:sld xmlns:a="http://schemas.openxmlformats.org/drawingml/2006/main" xmlns:r="http://schemas.openxmlformats.org/officeDocument/2006/relationships" xmlns:p="http://schemas.openxmlformats.org/presentationml/2006/main">
-  <p:cSld>
-    <p:spTree>
-      <p:nvGrpSpPr>
-        <p:cNvPr id="1" name=""/>
-        <p:cNvGrpSpPr/>
-        <p:nvPr/>
-      </p:nvGrpSpPr>
-      <p:grpSpPr>
-        <a:xfrm>
-          <a:off x="0" y="0"/>
-          <a:ext cx="0" cy="0"/>
-          <a:chOff x="0" y="0"/>
-          <a:chExt cx="0" cy="0"/>
-        </a:xfrm>
-      </p:grpSpPr>
-      <p:sp>
-        <p:nvSpPr>
-          <p:cNvPr id="2" name="Title 1">
-            <a:extLst>
-              <a:ext uri="{FF2B5EF4-FFF2-40B4-BE49-F238E27FC236}">
-                <a16:creationId xmlns:a16="http://schemas.microsoft.com/office/drawing/2014/main" id="{604600C7-441A-67BC-E209-B6AFC53F259B}"/>
-              </a:ext>
-            </a:extLst>
-          </p:cNvPr>
-          <p:cNvSpPr>
-            <a:spLocks noGrp="1"/>
-          </p:cNvSpPr>
-          <p:nvPr>
-            <p:ph type="title"/>
-          </p:nvPr>
-        </p:nvSpPr>
-        <p:spPr/>
-        <p:txBody>
-          <a:bodyPr/>
-          <a:lstStyle/>
-          <a:p>
-            <a:r>
-              <a:rPr lang="en-NO" dirty="0"/>
-              <a:t>Conclusion 1/2</a:t>
-            </a:r>
-          </a:p>
-        </p:txBody>
-      </p:sp>
-      <p:sp>
-        <p:nvSpPr>
-          <p:cNvPr id="3" name="Content Placeholder 2">
-            <a:extLst>
-              <a:ext uri="{FF2B5EF4-FFF2-40B4-BE49-F238E27FC236}">
-                <a16:creationId xmlns:a16="http://schemas.microsoft.com/office/drawing/2014/main" id="{60B35E1B-5450-7070-890E-6831BF9D5408}"/>
-              </a:ext>
-            </a:extLst>
-          </p:cNvPr>
-          <p:cNvSpPr>
-            <a:spLocks noGrp="1"/>
-          </p:cNvSpPr>
-          <p:nvPr>
-            <p:ph idx="1"/>
-          </p:nvPr>
-        </p:nvSpPr>
-        <p:spPr/>
-        <p:txBody>
-          <a:bodyPr>
-            <a:normAutofit lnSpcReduction="10000"/>
-          </a:bodyPr>
-          <a:lstStyle/>
-          <a:p>
-            <a:r>
-              <a:rPr lang="en-NO" dirty="0"/>
-              <a:t>Classification</a:t>
-            </a:r>
-          </a:p>
-          <a:p>
-            <a:pPr lvl="1"/>
-            <a:r>
-              <a:rPr lang="en-NO" dirty="0"/>
-              <a:t>LogReg or XGBoost do best (except at low thresholds)</a:t>
-            </a:r>
-          </a:p>
-          <a:p>
-            <a:pPr lvl="1"/>
-            <a:r>
-              <a:rPr lang="en-NO" dirty="0"/>
-              <a:t>XGBoost is the only one that stays above the baseline (“coin-toss”)</a:t>
-            </a:r>
-          </a:p>
-          <a:p>
-            <a:pPr lvl="1"/>
-            <a:r>
-              <a:rPr lang="en-NO" dirty="0"/>
-              <a:t>SVC isn’t doing very well</a:t>
-            </a:r>
-          </a:p>
-          <a:p>
-            <a:endParaRPr lang="en-NO" dirty="0"/>
-          </a:p>
-          <a:p>
-            <a:r>
-              <a:rPr lang="en-NO" dirty="0"/>
-              <a:t>Regression</a:t>
-            </a:r>
-          </a:p>
-          <a:p>
-            <a:pPr lvl="1"/>
-            <a:r>
-              <a:rPr lang="en-NO" dirty="0"/>
-              <a:t>Is really hard (target distribution is step-functiony), cf. horizontal stripes</a:t>
-            </a:r>
-          </a:p>
-          <a:p>
-            <a:pPr lvl="1"/>
-            <a:endParaRPr lang="en-NO" dirty="0"/>
-          </a:p>
-          <a:p>
-            <a:r>
-              <a:rPr lang="en-NO" dirty="0"/>
-              <a:t>Overall, I’d go with XGBoost</a:t>
-            </a:r>
-          </a:p>
-          <a:p>
-            <a:pPr lvl="1"/>
-            <a:r>
-              <a:rPr lang="en-GB" dirty="0"/>
-              <a:t>I</a:t>
-            </a:r>
-            <a:r>
-              <a:rPr lang="en-NO" dirty="0"/>
-              <a:t>t’s also “explainable”, so yay</a:t>
-            </a:r>
-          </a:p>
-        </p:txBody>
-      </p:sp>
-    </p:spTree>
-    <p:extLst>
-      <p:ext uri="{BB962C8B-B14F-4D97-AF65-F5344CB8AC3E}">
-        <p14:creationId xmlns:p14="http://schemas.microsoft.com/office/powerpoint/2010/main" val="1634168042"/>
-      </p:ext>
-    </p:extLst>
-  </p:cSld>
-  <p:clrMapOvr>
-    <a:masterClrMapping/>
-  </p:clrMapOvr>
-</p:sld>
-</file>
-
 <file path=ppt/slides/slide13.xml><?xml version="1.0" encoding="utf-8"?>
 <p:sld xmlns:a="http://schemas.openxmlformats.org/drawingml/2006/main" xmlns:r="http://schemas.openxmlformats.org/officeDocument/2006/relationships" xmlns:p="http://schemas.openxmlformats.org/presentationml/2006/main">
   <p:cSld>
@@ -3832,6 +3912,290 @@
           <a:chExt cx="0" cy="0"/>
         </a:xfrm>
       </p:grpSpPr>
+      <p:pic>
+        <p:nvPicPr>
+          <p:cNvPr id="4" name="Picture 2">
+            <a:extLst>
+              <a:ext uri="{FF2B5EF4-FFF2-40B4-BE49-F238E27FC236}">
+                <a16:creationId xmlns:a16="http://schemas.microsoft.com/office/drawing/2014/main" id="{362C6E9C-858B-1F35-B940-A573A4D5E4A8}"/>
+              </a:ext>
+            </a:extLst>
+          </p:cNvPr>
+          <p:cNvPicPr>
+            <a:picLocks noChangeAspect="1" noChangeArrowheads="1"/>
+          </p:cNvPicPr>
+          <p:nvPr/>
+        </p:nvPicPr>
+        <p:blipFill>
+          <a:blip r:embed="rId2">
+            <a:extLst>
+              <a:ext uri="{28A0092B-C50C-407E-A947-70E740481C1C}">
+                <a14:useLocalDpi xmlns:a14="http://schemas.microsoft.com/office/drawing/2010/main" val="0"/>
+              </a:ext>
+            </a:extLst>
+          </a:blip>
+          <a:srcRect/>
+          <a:stretch>
+            <a:fillRect/>
+          </a:stretch>
+        </p:blipFill>
+        <p:spPr bwMode="auto">
+          <a:xfrm>
+            <a:off x="4460072" y="1412378"/>
+            <a:ext cx="7480300" cy="5245100"/>
+          </a:xfrm>
+          <a:prstGeom prst="rect">
+            <a:avLst/>
+          </a:prstGeom>
+          <a:noFill/>
+          <a:extLst>
+            <a:ext uri="{909E8E84-426E-40DD-AFC4-6F175D3DCCD1}">
+              <a14:hiddenFill xmlns:a14="http://schemas.microsoft.com/office/drawing/2010/main">
+                <a:solidFill>
+                  <a:srgbClr val="FFFFFF"/>
+                </a:solidFill>
+              </a14:hiddenFill>
+            </a:ext>
+          </a:extLst>
+        </p:spPr>
+      </p:pic>
+      <p:sp>
+        <p:nvSpPr>
+          <p:cNvPr id="2" name="Title 1">
+            <a:extLst>
+              <a:ext uri="{FF2B5EF4-FFF2-40B4-BE49-F238E27FC236}">
+                <a16:creationId xmlns:a16="http://schemas.microsoft.com/office/drawing/2014/main" id="{9FC47821-D938-7A0D-D148-09674C3976B1}"/>
+              </a:ext>
+            </a:extLst>
+          </p:cNvPr>
+          <p:cNvSpPr>
+            <a:spLocks noGrp="1"/>
+          </p:cNvSpPr>
+          <p:nvPr>
+            <p:ph type="title"/>
+          </p:nvPr>
+        </p:nvSpPr>
+        <p:spPr/>
+        <p:txBody>
+          <a:bodyPr/>
+          <a:lstStyle/>
+          <a:p>
+            <a:r>
+              <a:rPr lang="en-NO" dirty="0"/>
+              <a:t>Classification</a:t>
+            </a:r>
+          </a:p>
+        </p:txBody>
+      </p:sp>
+      <p:sp>
+        <p:nvSpPr>
+          <p:cNvPr id="3" name="Content Placeholder 2">
+            <a:extLst>
+              <a:ext uri="{FF2B5EF4-FFF2-40B4-BE49-F238E27FC236}">
+                <a16:creationId xmlns:a16="http://schemas.microsoft.com/office/drawing/2014/main" id="{25110F7E-36E6-32AF-6D06-2F705B202EF2}"/>
+              </a:ext>
+            </a:extLst>
+          </p:cNvPr>
+          <p:cNvSpPr>
+            <a:spLocks noGrp="1"/>
+          </p:cNvSpPr>
+          <p:nvPr>
+            <p:ph idx="1"/>
+          </p:nvPr>
+        </p:nvSpPr>
+        <p:spPr>
+          <a:xfrm>
+            <a:off x="838200" y="1825625"/>
+            <a:ext cx="3260464" cy="4351338"/>
+          </a:xfrm>
+        </p:spPr>
+        <p:txBody>
+          <a:bodyPr/>
+          <a:lstStyle/>
+          <a:p>
+            <a:r>
+              <a:rPr lang="en-NO" dirty="0"/>
+              <a:t>Predict Y=False</a:t>
+            </a:r>
+          </a:p>
+        </p:txBody>
+      </p:sp>
+    </p:spTree>
+    <p:extLst>
+      <p:ext uri="{BB962C8B-B14F-4D97-AF65-F5344CB8AC3E}">
+        <p14:creationId xmlns:p14="http://schemas.microsoft.com/office/powerpoint/2010/main" val="963036620"/>
+      </p:ext>
+    </p:extLst>
+  </p:cSld>
+  <p:clrMapOvr>
+    <a:masterClrMapping/>
+  </p:clrMapOvr>
+</p:sld>
+</file>
+
+<file path=ppt/slides/slide14.xml><?xml version="1.0" encoding="utf-8"?>
+<p:sld xmlns:a="http://schemas.openxmlformats.org/drawingml/2006/main" xmlns:r="http://schemas.openxmlformats.org/officeDocument/2006/relationships" xmlns:p="http://schemas.openxmlformats.org/presentationml/2006/main">
+  <p:cSld>
+    <p:spTree>
+      <p:nvGrpSpPr>
+        <p:cNvPr id="1" name=""/>
+        <p:cNvGrpSpPr/>
+        <p:nvPr/>
+      </p:nvGrpSpPr>
+      <p:grpSpPr>
+        <a:xfrm>
+          <a:off x="0" y="0"/>
+          <a:ext cx="0" cy="0"/>
+          <a:chOff x="0" y="0"/>
+          <a:chExt cx="0" cy="0"/>
+        </a:xfrm>
+      </p:grpSpPr>
+      <p:sp>
+        <p:nvSpPr>
+          <p:cNvPr id="2" name="Title 1">
+            <a:extLst>
+              <a:ext uri="{FF2B5EF4-FFF2-40B4-BE49-F238E27FC236}">
+                <a16:creationId xmlns:a16="http://schemas.microsoft.com/office/drawing/2014/main" id="{604600C7-441A-67BC-E209-B6AFC53F259B}"/>
+              </a:ext>
+            </a:extLst>
+          </p:cNvPr>
+          <p:cNvSpPr>
+            <a:spLocks noGrp="1"/>
+          </p:cNvSpPr>
+          <p:nvPr>
+            <p:ph type="title"/>
+          </p:nvPr>
+        </p:nvSpPr>
+        <p:spPr/>
+        <p:txBody>
+          <a:bodyPr/>
+          <a:lstStyle/>
+          <a:p>
+            <a:r>
+              <a:rPr lang="en-NO" dirty="0"/>
+              <a:t>Conclusion 1/2</a:t>
+            </a:r>
+          </a:p>
+        </p:txBody>
+      </p:sp>
+      <p:sp>
+        <p:nvSpPr>
+          <p:cNvPr id="3" name="Content Placeholder 2">
+            <a:extLst>
+              <a:ext uri="{FF2B5EF4-FFF2-40B4-BE49-F238E27FC236}">
+                <a16:creationId xmlns:a16="http://schemas.microsoft.com/office/drawing/2014/main" id="{60B35E1B-5450-7070-890E-6831BF9D5408}"/>
+              </a:ext>
+            </a:extLst>
+          </p:cNvPr>
+          <p:cNvSpPr>
+            <a:spLocks noGrp="1"/>
+          </p:cNvSpPr>
+          <p:nvPr>
+            <p:ph idx="1"/>
+          </p:nvPr>
+        </p:nvSpPr>
+        <p:spPr/>
+        <p:txBody>
+          <a:bodyPr>
+            <a:normAutofit lnSpcReduction="10000"/>
+          </a:bodyPr>
+          <a:lstStyle/>
+          <a:p>
+            <a:r>
+              <a:rPr lang="en-NO" dirty="0"/>
+              <a:t>Classification</a:t>
+            </a:r>
+          </a:p>
+          <a:p>
+            <a:pPr lvl="1"/>
+            <a:r>
+              <a:rPr lang="en-NO" dirty="0"/>
+              <a:t>LogReg or XGBoost do best (except at low thresholds)</a:t>
+            </a:r>
+          </a:p>
+          <a:p>
+            <a:pPr lvl="1"/>
+            <a:r>
+              <a:rPr lang="en-NO" dirty="0"/>
+              <a:t>XGBoost is the only one that stays above the baseline (“coin-toss”)</a:t>
+            </a:r>
+          </a:p>
+          <a:p>
+            <a:pPr lvl="1"/>
+            <a:r>
+              <a:rPr lang="en-NO" dirty="0"/>
+              <a:t>SVC isn’t doing very well</a:t>
+            </a:r>
+          </a:p>
+          <a:p>
+            <a:endParaRPr lang="en-NO" dirty="0"/>
+          </a:p>
+          <a:p>
+            <a:r>
+              <a:rPr lang="en-NO" dirty="0"/>
+              <a:t>Regression</a:t>
+            </a:r>
+          </a:p>
+          <a:p>
+            <a:pPr lvl="1"/>
+            <a:r>
+              <a:rPr lang="en-NO" dirty="0"/>
+              <a:t>Is really hard (target distribution is step-functiony), cf. horizontal stripes</a:t>
+            </a:r>
+          </a:p>
+          <a:p>
+            <a:pPr lvl="1"/>
+            <a:endParaRPr lang="en-NO" dirty="0"/>
+          </a:p>
+          <a:p>
+            <a:r>
+              <a:rPr lang="en-NO" dirty="0"/>
+              <a:t>Overall, I’d go with XGBoost</a:t>
+            </a:r>
+          </a:p>
+          <a:p>
+            <a:pPr lvl="1"/>
+            <a:r>
+              <a:rPr lang="en-GB" dirty="0"/>
+              <a:t>I</a:t>
+            </a:r>
+            <a:r>
+              <a:rPr lang="en-NO" dirty="0"/>
+              <a:t>t’s also “explainable”, so yay</a:t>
+            </a:r>
+          </a:p>
+        </p:txBody>
+      </p:sp>
+    </p:spTree>
+    <p:extLst>
+      <p:ext uri="{BB962C8B-B14F-4D97-AF65-F5344CB8AC3E}">
+        <p14:creationId xmlns:p14="http://schemas.microsoft.com/office/powerpoint/2010/main" val="1634168042"/>
+      </p:ext>
+    </p:extLst>
+  </p:cSld>
+  <p:clrMapOvr>
+    <a:masterClrMapping/>
+  </p:clrMapOvr>
+</p:sld>
+</file>
+
+<file path=ppt/slides/slide15.xml><?xml version="1.0" encoding="utf-8"?>
+<p:sld xmlns:a="http://schemas.openxmlformats.org/drawingml/2006/main" xmlns:r="http://schemas.openxmlformats.org/officeDocument/2006/relationships" xmlns:p="http://schemas.openxmlformats.org/presentationml/2006/main">
+  <p:cSld>
+    <p:spTree>
+      <p:nvGrpSpPr>
+        <p:cNvPr id="1" name=""/>
+        <p:cNvGrpSpPr/>
+        <p:nvPr/>
+      </p:nvGrpSpPr>
+      <p:grpSpPr>
+        <a:xfrm>
+          <a:off x="0" y="0"/>
+          <a:ext cx="0" cy="0"/>
+          <a:chOff x="0" y="0"/>
+          <a:chExt cx="0" cy="0"/>
+        </a:xfrm>
+      </p:grpSpPr>
       <p:sp>
         <p:nvSpPr>
           <p:cNvPr id="2" name="Title 1">
@@ -3925,7 +4289,7 @@
 </p:sld>
 </file>
 
-<file path=ppt/slides/slide14.xml><?xml version="1.0" encoding="utf-8"?>
+<file path=ppt/slides/slide16.xml><?xml version="1.0" encoding="utf-8"?>
 <p:sld xmlns:a="http://schemas.openxmlformats.org/drawingml/2006/main" xmlns:r="http://schemas.openxmlformats.org/officeDocument/2006/relationships" xmlns:p="http://schemas.openxmlformats.org/presentationml/2006/main">
   <p:cSld>
     <p:spTree>
@@ -5847,7 +6211,9 @@
             </a:r>
           </a:p>
           <a:p>
-            <a:pPr lvl="1"/>
+            <a:pPr marL="457200" lvl="1" indent="0">
+              <a:buNone/>
+            </a:pPr>
             <a:endParaRPr lang="en-NO" dirty="0"/>
           </a:p>
           <a:p>

</xml_diff>